<commit_message>
Last upload of my slides
</commit_message>
<xml_diff>
--- a/MCTV LTD Presentation.pptx
+++ b/MCTV LTD Presentation.pptx
@@ -14,7 +14,9 @@
     <p:sldId id="265" r:id="rId8"/>
     <p:sldId id="266" r:id="rId9"/>
     <p:sldId id="267" r:id="rId10"/>
-    <p:sldId id="269" r:id="rId11"/>
+    <p:sldId id="270" r:id="rId11"/>
+    <p:sldId id="268" r:id="rId12"/>
+    <p:sldId id="269" r:id="rId13"/>
   </p:sldIdLst>
   <p:sldSz cx="12192000" cy="6858000"/>
   <p:notesSz cx="6858000" cy="9144000"/>
@@ -252,7 +254,7 @@
           <a:p>
             <a:fld id="{9ADD1E9F-E232-4585-89E8-ABD561F0A9B3}" type="datetimeFigureOut">
               <a:rPr lang="en-IE" smtClean="0"/>
-              <a:t>07/04/2017</a:t>
+              <a:t>18/04/2017</a:t>
             </a:fld>
             <a:endParaRPr lang="en-IE"/>
           </a:p>
@@ -422,7 +424,7 @@
           <a:p>
             <a:fld id="{9ADD1E9F-E232-4585-89E8-ABD561F0A9B3}" type="datetimeFigureOut">
               <a:rPr lang="en-IE" smtClean="0"/>
-              <a:t>07/04/2017</a:t>
+              <a:t>18/04/2017</a:t>
             </a:fld>
             <a:endParaRPr lang="en-IE"/>
           </a:p>
@@ -602,7 +604,7 @@
           <a:p>
             <a:fld id="{9ADD1E9F-E232-4585-89E8-ABD561F0A9B3}" type="datetimeFigureOut">
               <a:rPr lang="en-IE" smtClean="0"/>
-              <a:t>07/04/2017</a:t>
+              <a:t>18/04/2017</a:t>
             </a:fld>
             <a:endParaRPr lang="en-IE"/>
           </a:p>
@@ -781,7 +783,7 @@
           <a:p>
             <a:fld id="{9ADD1E9F-E232-4585-89E8-ABD561F0A9B3}" type="datetimeFigureOut">
               <a:rPr lang="en-IE" smtClean="0"/>
-              <a:t>07/04/2017</a:t>
+              <a:t>18/04/2017</a:t>
             </a:fld>
             <a:endParaRPr lang="en-IE"/>
           </a:p>
@@ -1027,7 +1029,7 @@
           <a:p>
             <a:fld id="{9ADD1E9F-E232-4585-89E8-ABD561F0A9B3}" type="datetimeFigureOut">
               <a:rPr lang="en-IE" smtClean="0"/>
-              <a:t>07/04/2017</a:t>
+              <a:t>18/04/2017</a:t>
             </a:fld>
             <a:endParaRPr lang="en-IE"/>
           </a:p>
@@ -1259,7 +1261,7 @@
           <a:p>
             <a:fld id="{9ADD1E9F-E232-4585-89E8-ABD561F0A9B3}" type="datetimeFigureOut">
               <a:rPr lang="en-IE" smtClean="0"/>
-              <a:t>07/04/2017</a:t>
+              <a:t>18/04/2017</a:t>
             </a:fld>
             <a:endParaRPr lang="en-IE"/>
           </a:p>
@@ -1626,7 +1628,7 @@
           <a:p>
             <a:fld id="{9ADD1E9F-E232-4585-89E8-ABD561F0A9B3}" type="datetimeFigureOut">
               <a:rPr lang="en-IE" smtClean="0"/>
-              <a:t>07/04/2017</a:t>
+              <a:t>18/04/2017</a:t>
             </a:fld>
             <a:endParaRPr lang="en-IE"/>
           </a:p>
@@ -1744,7 +1746,7 @@
           <a:p>
             <a:fld id="{9ADD1E9F-E232-4585-89E8-ABD561F0A9B3}" type="datetimeFigureOut">
               <a:rPr lang="en-IE" smtClean="0"/>
-              <a:t>07/04/2017</a:t>
+              <a:t>18/04/2017</a:t>
             </a:fld>
             <a:endParaRPr lang="en-IE"/>
           </a:p>
@@ -1839,7 +1841,7 @@
           <a:p>
             <a:fld id="{9ADD1E9F-E232-4585-89E8-ABD561F0A9B3}" type="datetimeFigureOut">
               <a:rPr lang="en-IE" smtClean="0"/>
-              <a:t>07/04/2017</a:t>
+              <a:t>18/04/2017</a:t>
             </a:fld>
             <a:endParaRPr lang="en-IE"/>
           </a:p>
@@ -2116,7 +2118,7 @@
           <a:p>
             <a:fld id="{9ADD1E9F-E232-4585-89E8-ABD561F0A9B3}" type="datetimeFigureOut">
               <a:rPr lang="en-IE" smtClean="0"/>
-              <a:t>07/04/2017</a:t>
+              <a:t>18/04/2017</a:t>
             </a:fld>
             <a:endParaRPr lang="en-IE"/>
           </a:p>
@@ -2369,7 +2371,7 @@
           <a:p>
             <a:fld id="{9ADD1E9F-E232-4585-89E8-ABD561F0A9B3}" type="datetimeFigureOut">
               <a:rPr lang="en-IE" smtClean="0"/>
-              <a:t>07/04/2017</a:t>
+              <a:t>18/04/2017</a:t>
             </a:fld>
             <a:endParaRPr lang="en-IE"/>
           </a:p>
@@ -2590,7 +2592,7 @@
           <a:p>
             <a:fld id="{9ADD1E9F-E232-4585-89E8-ABD561F0A9B3}" type="datetimeFigureOut">
               <a:rPr lang="en-IE" smtClean="0"/>
-              <a:t>07/04/2017</a:t>
+              <a:t>18/04/2017</a:t>
             </a:fld>
             <a:endParaRPr lang="en-IE"/>
           </a:p>
@@ -3277,6 +3279,319 @@
           <a:lstStyle/>
           <a:p>
             <a:r>
+              <a:rPr lang="en-GB" dirty="0" smtClean="0"/>
+              <a:t>My Page</a:t>
+            </a:r>
+            <a:endParaRPr lang="en-GB" dirty="0"/>
+          </a:p>
+        </p:txBody>
+      </p:sp>
+      <p:sp>
+        <p:nvSpPr>
+          <p:cNvPr id="3" name="Content Placeholder 2"/>
+          <p:cNvSpPr>
+            <a:spLocks noGrp="1"/>
+          </p:cNvSpPr>
+          <p:nvPr>
+            <p:ph sz="half" idx="1"/>
+          </p:nvPr>
+        </p:nvSpPr>
+        <p:spPr/>
+        <p:txBody>
+          <a:bodyPr/>
+          <a:lstStyle/>
+          <a:p>
+            <a:r>
+              <a:rPr lang="en-GB" dirty="0" smtClean="0"/>
+              <a:t>Created a post with all my project work on it</a:t>
+            </a:r>
+          </a:p>
+          <a:p>
+            <a:r>
+              <a:rPr lang="en-GB" dirty="0" smtClean="0"/>
+              <a:t>Added images from each part of the project</a:t>
+            </a:r>
+          </a:p>
+          <a:p>
+            <a:r>
+              <a:rPr lang="en-GB" dirty="0" smtClean="0"/>
+              <a:t>Images move into post as you scroll through it</a:t>
+            </a:r>
+          </a:p>
+          <a:p>
+            <a:r>
+              <a:rPr lang="en-GB" dirty="0" smtClean="0"/>
+              <a:t>Added a link through from LinkedIn</a:t>
+            </a:r>
+          </a:p>
+          <a:p>
+            <a:endParaRPr lang="en-GB" dirty="0"/>
+          </a:p>
+        </p:txBody>
+      </p:sp>
+      <p:pic>
+        <p:nvPicPr>
+          <p:cNvPr id="6" name="Content Placeholder 5"/>
+          <p:cNvPicPr>
+            <a:picLocks noGrp="1" noChangeAspect="1"/>
+          </p:cNvPicPr>
+          <p:nvPr>
+            <p:ph sz="half" idx="2"/>
+          </p:nvPr>
+        </p:nvPicPr>
+        <p:blipFill rotWithShape="1">
+          <a:blip r:embed="rId2"/>
+          <a:srcRect l="22431" t="8414" r="23203" b="5629"/>
+          <a:stretch/>
+        </p:blipFill>
+        <p:spPr>
+          <a:xfrm>
+            <a:off x="6258172" y="1825625"/>
+            <a:ext cx="4875068" cy="4351338"/>
+          </a:xfrm>
+          <a:prstGeom prst="rect">
+            <a:avLst/>
+          </a:prstGeom>
+        </p:spPr>
+      </p:pic>
+      <p:sp>
+        <p:nvSpPr>
+          <p:cNvPr id="5" name="Rectangle 4"/>
+          <p:cNvSpPr/>
+          <p:nvPr/>
+        </p:nvSpPr>
+        <p:spPr>
+          <a:xfrm>
+            <a:off x="101944" y="884184"/>
+            <a:ext cx="1861472" cy="369332"/>
+          </a:xfrm>
+          <a:prstGeom prst="rect">
+            <a:avLst/>
+          </a:prstGeom>
+        </p:spPr>
+        <p:txBody>
+          <a:bodyPr wrap="none">
+            <a:spAutoFit/>
+          </a:bodyPr>
+          <a:lstStyle/>
+          <a:p>
+            <a:r>
+              <a:rPr lang="en-GB" dirty="0">
+                <a:solidFill>
+                  <a:schemeClr val="bg1"/>
+                </a:solidFill>
+              </a:rPr>
+              <a:t>Ciara 0’Donoghue</a:t>
+            </a:r>
+            <a:endParaRPr lang="en-IE" dirty="0">
+              <a:solidFill>
+                <a:schemeClr val="bg1"/>
+              </a:solidFill>
+            </a:endParaRPr>
+          </a:p>
+        </p:txBody>
+      </p:sp>
+    </p:spTree>
+    <p:extLst>
+      <p:ext uri="{BB962C8B-B14F-4D97-AF65-F5344CB8AC3E}">
+        <p14:creationId xmlns:p14="http://schemas.microsoft.com/office/powerpoint/2010/main" val="3860310362"/>
+      </p:ext>
+    </p:extLst>
+  </p:cSld>
+  <p:clrMapOvr>
+    <a:masterClrMapping/>
+  </p:clrMapOvr>
+</p:sld>
+</file>
+
+<file path=ppt/slides/slide11.xml><?xml version="1.0" encoding="utf-8"?>
+<p:sld xmlns:a="http://schemas.openxmlformats.org/drawingml/2006/main" xmlns:r="http://schemas.openxmlformats.org/officeDocument/2006/relationships" xmlns:p="http://schemas.openxmlformats.org/presentationml/2006/main">
+  <p:cSld>
+    <p:spTree>
+      <p:nvGrpSpPr>
+        <p:cNvPr id="1" name=""/>
+        <p:cNvGrpSpPr/>
+        <p:nvPr/>
+      </p:nvGrpSpPr>
+      <p:grpSpPr>
+        <a:xfrm>
+          <a:off x="0" y="0"/>
+          <a:ext cx="0" cy="0"/>
+          <a:chOff x="0" y="0"/>
+          <a:chExt cx="0" cy="0"/>
+        </a:xfrm>
+      </p:grpSpPr>
+      <p:sp>
+        <p:nvSpPr>
+          <p:cNvPr id="2" name="Title 1"/>
+          <p:cNvSpPr>
+            <a:spLocks noGrp="1"/>
+          </p:cNvSpPr>
+          <p:nvPr>
+            <p:ph type="title"/>
+          </p:nvPr>
+        </p:nvSpPr>
+        <p:spPr/>
+        <p:txBody>
+          <a:bodyPr/>
+          <a:lstStyle/>
+          <a:p>
+            <a:r>
+              <a:rPr lang="en-GB" dirty="0"/>
+              <a:t>Conclusion and Findings</a:t>
+            </a:r>
+          </a:p>
+        </p:txBody>
+      </p:sp>
+      <p:sp>
+        <p:nvSpPr>
+          <p:cNvPr id="3" name="Content Placeholder 2"/>
+          <p:cNvSpPr>
+            <a:spLocks noGrp="1"/>
+          </p:cNvSpPr>
+          <p:nvPr>
+            <p:ph sz="half" idx="1"/>
+          </p:nvPr>
+        </p:nvSpPr>
+        <p:spPr>
+          <a:xfrm>
+            <a:off x="838200" y="1825625"/>
+            <a:ext cx="10515600" cy="4351338"/>
+          </a:xfrm>
+        </p:spPr>
+        <p:txBody>
+          <a:bodyPr/>
+          <a:lstStyle/>
+          <a:p>
+            <a:r>
+              <a:rPr lang="en-GB" dirty="0"/>
+              <a:t>Future Developments</a:t>
+            </a:r>
+          </a:p>
+          <a:p>
+            <a:r>
+              <a:rPr lang="en-GB" dirty="0"/>
+              <a:t>Open more stores</a:t>
+            </a:r>
+          </a:p>
+          <a:p>
+            <a:r>
+              <a:rPr lang="en-GB" dirty="0"/>
+              <a:t>Increase technology throughout the business as necessary</a:t>
+            </a:r>
+          </a:p>
+          <a:p>
+            <a:r>
+              <a:rPr lang="en-GB" dirty="0"/>
+              <a:t>Increase online presence</a:t>
+            </a:r>
+          </a:p>
+          <a:p>
+            <a:r>
+              <a:rPr lang="en-GB" dirty="0"/>
+              <a:t>Convert all paper records into online records</a:t>
+            </a:r>
+          </a:p>
+          <a:p>
+            <a:r>
+              <a:rPr lang="en-GB" dirty="0"/>
+              <a:t>Keep seeking new suppliers to increase profit margins</a:t>
+            </a:r>
+          </a:p>
+          <a:p>
+            <a:endParaRPr lang="en-GB" dirty="0"/>
+          </a:p>
+          <a:p>
+            <a:endParaRPr lang="en-GB" dirty="0"/>
+          </a:p>
+          <a:p>
+            <a:endParaRPr lang="en-GB" dirty="0"/>
+          </a:p>
+        </p:txBody>
+      </p:sp>
+      <p:sp>
+        <p:nvSpPr>
+          <p:cNvPr id="6" name="Rectangle 5"/>
+          <p:cNvSpPr/>
+          <p:nvPr/>
+        </p:nvSpPr>
+        <p:spPr>
+          <a:xfrm>
+            <a:off x="0" y="897832"/>
+            <a:ext cx="1861472" cy="369332"/>
+          </a:xfrm>
+          <a:prstGeom prst="rect">
+            <a:avLst/>
+          </a:prstGeom>
+        </p:spPr>
+        <p:txBody>
+          <a:bodyPr wrap="none">
+            <a:spAutoFit/>
+          </a:bodyPr>
+          <a:lstStyle/>
+          <a:p>
+            <a:r>
+              <a:rPr lang="en-GB" dirty="0">
+                <a:solidFill>
+                  <a:schemeClr val="bg1"/>
+                </a:solidFill>
+              </a:rPr>
+              <a:t>Ciara 0’Donoghue</a:t>
+            </a:r>
+            <a:endParaRPr lang="en-IE" dirty="0">
+              <a:solidFill>
+                <a:schemeClr val="bg1"/>
+              </a:solidFill>
+            </a:endParaRPr>
+          </a:p>
+        </p:txBody>
+      </p:sp>
+    </p:spTree>
+    <p:extLst>
+      <p:ext uri="{BB962C8B-B14F-4D97-AF65-F5344CB8AC3E}">
+        <p14:creationId xmlns:p14="http://schemas.microsoft.com/office/powerpoint/2010/main" val="3315335411"/>
+      </p:ext>
+    </p:extLst>
+  </p:cSld>
+  <p:clrMapOvr>
+    <a:masterClrMapping/>
+  </p:clrMapOvr>
+</p:sld>
+</file>
+
+<file path=ppt/slides/slide12.xml><?xml version="1.0" encoding="utf-8"?>
+<p:sld xmlns:a="http://schemas.openxmlformats.org/drawingml/2006/main" xmlns:r="http://schemas.openxmlformats.org/officeDocument/2006/relationships" xmlns:p="http://schemas.openxmlformats.org/presentationml/2006/main">
+  <p:cSld>
+    <p:spTree>
+      <p:nvGrpSpPr>
+        <p:cNvPr id="1" name=""/>
+        <p:cNvGrpSpPr/>
+        <p:nvPr/>
+      </p:nvGrpSpPr>
+      <p:grpSpPr>
+        <a:xfrm>
+          <a:off x="0" y="0"/>
+          <a:ext cx="0" cy="0"/>
+          <a:chOff x="0" y="0"/>
+          <a:chExt cx="0" cy="0"/>
+        </a:xfrm>
+      </p:grpSpPr>
+      <p:sp>
+        <p:nvSpPr>
+          <p:cNvPr id="2" name="Title 1"/>
+          <p:cNvSpPr>
+            <a:spLocks noGrp="1"/>
+          </p:cNvSpPr>
+          <p:nvPr>
+            <p:ph type="title"/>
+          </p:nvPr>
+        </p:nvSpPr>
+        <p:spPr/>
+        <p:txBody>
+          <a:bodyPr/>
+          <a:lstStyle/>
+          <a:p>
+            <a:r>
               <a:rPr lang="en-GB" dirty="0"/>
               <a:t>Any Questions</a:t>
             </a:r>
@@ -4523,48 +4838,64 @@
           <a:lstStyle/>
           <a:p>
             <a:r>
-              <a:rPr lang="en-GB" dirty="0"/>
-              <a:t>Home page</a:t>
-            </a:r>
-          </a:p>
-          <a:p>
-            <a:r>
-              <a:rPr lang="en-GB" dirty="0"/>
-              <a:t>Page for each of the team members</a:t>
-            </a:r>
-          </a:p>
-          <a:p>
-            <a:r>
-              <a:rPr lang="en-GB" dirty="0"/>
-              <a:t>In </a:t>
-            </a:r>
-            <a:r>
-              <a:rPr lang="en-GB" dirty="0" err="1"/>
-              <a:t>wordpress</a:t>
+              <a:rPr lang="en-GB" dirty="0" smtClean="0"/>
+              <a:t>Created the homepage</a:t>
             </a:r>
             <a:endParaRPr lang="en-GB" dirty="0"/>
           </a:p>
-        </p:txBody>
-      </p:sp>
-      <p:sp>
-        <p:nvSpPr>
-          <p:cNvPr id="4" name="Content Placeholder 3"/>
-          <p:cNvSpPr>
-            <a:spLocks noGrp="1"/>
-          </p:cNvSpPr>
+          <a:p>
+            <a:r>
+              <a:rPr lang="en-GB" dirty="0" smtClean="0"/>
+              <a:t>Designed the layout keeping company colours</a:t>
+            </a:r>
+            <a:endParaRPr lang="en-GB" dirty="0"/>
+          </a:p>
+          <a:p>
+            <a:r>
+              <a:rPr lang="en-GB" dirty="0" smtClean="0"/>
+              <a:t>Created user logins for other team members</a:t>
+            </a:r>
+          </a:p>
+          <a:p>
+            <a:r>
+              <a:rPr lang="en-GB" dirty="0" smtClean="0"/>
+              <a:t>Created and inserted company logo</a:t>
+            </a:r>
+          </a:p>
+          <a:p>
+            <a:r>
+              <a:rPr lang="en-GB" dirty="0" smtClean="0"/>
+              <a:t>www.sabproject.host22.com</a:t>
+            </a:r>
+            <a:endParaRPr lang="en-GB" dirty="0"/>
+          </a:p>
+        </p:txBody>
+      </p:sp>
+      <p:pic>
+        <p:nvPicPr>
+          <p:cNvPr id="6" name="Content Placeholder 5"/>
+          <p:cNvPicPr>
+            <a:picLocks noGrp="1" noChangeAspect="1"/>
+          </p:cNvPicPr>
           <p:nvPr>
             <p:ph sz="half" idx="2"/>
           </p:nvPr>
-        </p:nvSpPr>
-        <p:spPr/>
-        <p:txBody>
-          <a:bodyPr/>
-          <a:lstStyle/>
-          <a:p>
-            <a:endParaRPr lang="en-GB"/>
-          </a:p>
-        </p:txBody>
-      </p:sp>
+        </p:nvPicPr>
+        <p:blipFill rotWithShape="1">
+          <a:blip r:embed="rId2"/>
+          <a:srcRect l="21532" t="8689" r="22629" b="5581"/>
+          <a:stretch/>
+        </p:blipFill>
+        <p:spPr>
+          <a:xfrm>
+            <a:off x="6266559" y="1825625"/>
+            <a:ext cx="5040897" cy="4351338"/>
+          </a:xfrm>
+          <a:prstGeom prst="rect">
+            <a:avLst/>
+          </a:prstGeom>
+        </p:spPr>
+      </p:pic>
       <p:sp>
         <p:nvSpPr>
           <p:cNvPr id="5" name="Rectangle 4"/>

</xml_diff>